<commit_message>
revise: name ordering for WeeklyUpdateTemplate.pptx and first week update
</commit_message>
<xml_diff>
--- a/docs/WeeklyUpdates/WeeklyUpdateTemplate.pptx
+++ b/docs/WeeklyUpdates/WeeklyUpdateTemplate.pptx
@@ -209,7 +209,7 @@
           <a:p>
             <a:fld id="{435793A2-C00B-48F1-8F7C-3BE850BB26D7}" type="datetimeFigureOut">
               <a:rPr lang="en-US" smtClean="0"/>
-              <a:t>10/29/20</a:t>
+              <a:t>10/30/20</a:t>
             </a:fld>
             <a:endParaRPr lang="en-US"/>
           </a:p>
@@ -4082,14 +4082,13 @@
               <a:lnSpc>
                 <a:spcPct val="200000"/>
               </a:lnSpc>
-              <a:buFont typeface="Arial" pitchFamily="34" charset="0"/>
               <a:buNone/>
             </a:pPr>
             <a:r>
               <a:rPr lang="en-US" altLang="en-US" sz="1600" dirty="0">
                 <a:ea typeface="ＭＳ Ｐゴシック" pitchFamily="34" charset="-128"/>
               </a:rPr>
-              <a:t>Andrew Nguyen | Colton </a:t>
+              <a:t>Andrew Nguyen | Bryce George | Colton </a:t>
             </a:r>
             <a:r>
               <a:rPr lang="en-US" altLang="en-US" sz="1600" dirty="0" err="1">
@@ -4101,7 +4100,7 @@
               <a:rPr lang="en-US" altLang="en-US" sz="1600" dirty="0">
                 <a:ea typeface="ＭＳ Ｐゴシック" pitchFamily="34" charset="-128"/>
               </a:rPr>
-              <a:t> | Bryce George | William Ross</a:t>
+              <a:t> | William Ross</a:t>
             </a:r>
           </a:p>
           <a:p>

</xml_diff>

<commit_message>
revise: weekly update template and first update revisions
</commit_message>
<xml_diff>
--- a/docs/WeeklyUpdates/WeeklyUpdateTemplate.pptx
+++ b/docs/WeeklyUpdates/WeeklyUpdateTemplate.pptx
@@ -3855,57 +3855,6 @@
       </p:grpSpPr>
       <p:sp>
         <p:nvSpPr>
-          <p:cNvPr id="8" name="Rectangle 2"/>
-          <p:cNvSpPr txBox="1">
-            <a:spLocks noChangeArrowheads="1"/>
-          </p:cNvSpPr>
-          <p:nvPr/>
-        </p:nvSpPr>
-        <p:spPr>
-          <a:xfrm>
-            <a:off x="419100" y="914400"/>
-            <a:ext cx="8229600" cy="609600"/>
-          </a:xfrm>
-          <a:prstGeom prst="rect">
-            <a:avLst/>
-          </a:prstGeom>
-        </p:spPr>
-        <p:txBody>
-          <a:bodyPr vert="horz" lIns="91440" tIns="45720" rIns="91440" bIns="45720" rtlCol="0" anchor="ctr">
-            <a:normAutofit lnSpcReduction="10000"/>
-          </a:bodyPr>
-          <a:lstStyle>
-            <a:lvl1pPr algn="l" defTabSz="914400" rtl="0" eaLnBrk="1" latinLnBrk="0" hangingPunct="1">
-              <a:spcBef>
-                <a:spcPct val="0"/>
-              </a:spcBef>
-              <a:buNone/>
-              <a:defRPr sz="4000" kern="1200">
-                <a:solidFill>
-                  <a:schemeClr val="tx1"/>
-                </a:solidFill>
-                <a:latin typeface="+mj-lt"/>
-                <a:ea typeface="+mj-ea"/>
-                <a:cs typeface="+mj-cs"/>
-              </a:defRPr>
-            </a:lvl1pPr>
-          </a:lstStyle>
-          <a:p>
-            <a:pPr algn="ctr"/>
-            <a:r>
-              <a:rPr lang="en-US" altLang="en-US" sz="3600" dirty="0">
-                <a:ea typeface="ＭＳ Ｐゴシック" pitchFamily="34" charset="-128"/>
-              </a:rPr>
-              <a:t>Social Robotics 2</a:t>
-            </a:r>
-            <a:endParaRPr lang="en-US" altLang="en-US" dirty="0">
-              <a:ea typeface="ＭＳ Ｐゴシック" pitchFamily="34" charset="-128"/>
-            </a:endParaRPr>
-          </a:p>
-        </p:txBody>
-      </p:sp>
-      <p:sp>
-        <p:nvSpPr>
           <p:cNvPr id="9" name="Rectangle 3"/>
           <p:cNvSpPr txBox="1">
             <a:spLocks noChangeArrowheads="1"/>
@@ -4195,6 +4144,114 @@
               <a:t>1</a:t>
             </a:fld>
             <a:endParaRPr lang="en-US"/>
+          </a:p>
+        </p:txBody>
+      </p:sp>
+      <p:sp>
+        <p:nvSpPr>
+          <p:cNvPr id="7" name="Rectangle 2">
+            <a:extLst>
+              <a:ext uri="{FF2B5EF4-FFF2-40B4-BE49-F238E27FC236}">
+                <a16:creationId xmlns:a16="http://schemas.microsoft.com/office/drawing/2014/main" id="{FBA36F43-BF41-674F-B195-88293086512B}"/>
+              </a:ext>
+            </a:extLst>
+          </p:cNvPr>
+          <p:cNvSpPr txBox="1">
+            <a:spLocks noChangeArrowheads="1"/>
+          </p:cNvSpPr>
+          <p:nvPr/>
+        </p:nvSpPr>
+        <p:spPr>
+          <a:xfrm>
+            <a:off x="457200" y="609600"/>
+            <a:ext cx="8229600" cy="1371600"/>
+          </a:xfrm>
+          <a:prstGeom prst="rect">
+            <a:avLst/>
+          </a:prstGeom>
+        </p:spPr>
+        <p:txBody>
+          <a:bodyPr vert="horz" lIns="91440" tIns="45720" rIns="91440" bIns="45720" rtlCol="0" anchor="ctr">
+            <a:normAutofit/>
+          </a:bodyPr>
+          <a:lstStyle>
+            <a:lvl1pPr algn="l" defTabSz="914400" rtl="0" eaLnBrk="1" latinLnBrk="0" hangingPunct="1">
+              <a:spcBef>
+                <a:spcPct val="0"/>
+              </a:spcBef>
+              <a:buNone/>
+              <a:defRPr sz="4000" kern="1200">
+                <a:solidFill>
+                  <a:schemeClr val="tx1"/>
+                </a:solidFill>
+                <a:latin typeface="+mj-lt"/>
+                <a:ea typeface="+mj-ea"/>
+                <a:cs typeface="+mj-cs"/>
+              </a:defRPr>
+            </a:lvl1pPr>
+          </a:lstStyle>
+          <a:p>
+            <a:pPr algn="ctr"/>
+            <a:r>
+              <a:rPr lang="en-US" altLang="en-US" sz="3600" dirty="0">
+                <a:ea typeface="ＭＳ Ｐゴシック" pitchFamily="34" charset="-128"/>
+              </a:rPr>
+              <a:t>Social Robotics 2</a:t>
+            </a:r>
+          </a:p>
+          <a:p>
+            <a:pPr algn="ctr"/>
+            <a:r>
+              <a:rPr lang="en-US" altLang="en-US" sz="3600" dirty="0">
+                <a:ea typeface="ＭＳ Ｐゴシック" pitchFamily="34" charset="-128"/>
+              </a:rPr>
+              <a:t>Weekly Report for </a:t>
+            </a:r>
+            <a:r>
+              <a:rPr lang="en-US" altLang="en-US" sz="3600" i="1" dirty="0">
+                <a:ea typeface="ＭＳ Ｐゴシック" pitchFamily="34" charset="-128"/>
+              </a:rPr>
+              <a:t>#</a:t>
+            </a:r>
+            <a:r>
+              <a:rPr lang="en-US" altLang="en-US" sz="3600" dirty="0">
+                <a:ea typeface="ＭＳ Ｐゴシック" pitchFamily="34" charset="-128"/>
+              </a:rPr>
+              <a:t>-</a:t>
+            </a:r>
+            <a:r>
+              <a:rPr lang="en-US" altLang="en-US" sz="3600" i="1" dirty="0">
+                <a:ea typeface="ＭＳ Ｐゴシック" pitchFamily="34" charset="-128"/>
+              </a:rPr>
+              <a:t>#</a:t>
+            </a:r>
+            <a:r>
+              <a:rPr lang="en-US" altLang="en-US" sz="3600" dirty="0">
+                <a:ea typeface="ＭＳ Ｐゴシック" pitchFamily="34" charset="-128"/>
+              </a:rPr>
+              <a:t> </a:t>
+            </a:r>
+            <a:r>
+              <a:rPr lang="en-US" altLang="en-US" sz="3600" i="1" dirty="0">
+                <a:ea typeface="ＭＳ Ｐゴシック" pitchFamily="34" charset="-128"/>
+              </a:rPr>
+              <a:t>Month</a:t>
+            </a:r>
+            <a:r>
+              <a:rPr lang="en-US" altLang="en-US" sz="3600" dirty="0">
+                <a:ea typeface="ＭＳ Ｐゴシック" pitchFamily="34" charset="-128"/>
+              </a:rPr>
+              <a:t> </a:t>
+            </a:r>
+            <a:r>
+              <a:rPr lang="en-US" altLang="en-US" sz="3600" i="1" dirty="0">
+                <a:ea typeface="ＭＳ Ｐゴシック" pitchFamily="34" charset="-128"/>
+              </a:rPr>
+              <a:t>Year</a:t>
+            </a:r>
+            <a:endParaRPr lang="en-US" altLang="en-US" i="1" dirty="0">
+              <a:ea typeface="ＭＳ Ｐゴシック" pitchFamily="34" charset="-128"/>
+            </a:endParaRPr>
           </a:p>
         </p:txBody>
       </p:sp>

</xml_diff>

<commit_message>
revise: update to template
</commit_message>
<xml_diff>
--- a/docs/WeeklyUpdates/WeeklyUpdateTemplate.pptx
+++ b/docs/WeeklyUpdates/WeeklyUpdateTemplate.pptx
@@ -209,7 +209,7 @@
           <a:p>
             <a:fld id="{435793A2-C00B-48F1-8F7C-3BE850BB26D7}" type="datetimeFigureOut">
               <a:rPr lang="en-US" smtClean="0"/>
-              <a:t>11/5/20</a:t>
+              <a:t>11/12/20</a:t>
             </a:fld>
             <a:endParaRPr lang="en-US"/>
           </a:p>
@@ -4100,7 +4100,7 @@
               <a:rPr lang="en-US" altLang="en-US" sz="1600" dirty="0">
                 <a:ea typeface="ＭＳ Ｐゴシック" pitchFamily="34" charset="-128"/>
               </a:rPr>
-              <a:t>&lt;Faculty Sponsor&gt;</a:t>
+              <a:t>Mr. Bill Michael</a:t>
             </a:r>
           </a:p>
           <a:p>
@@ -4205,51 +4205,9 @@
               <a:rPr lang="en-US" altLang="en-US" sz="3600" dirty="0">
                 <a:ea typeface="ＭＳ Ｐゴシック" pitchFamily="34" charset="-128"/>
               </a:rPr>
-              <a:t>Weekly Report for </a:t>
-            </a:r>
-            <a:r>
-              <a:rPr lang="en-US" altLang="en-US" sz="3600" i="1" dirty="0">
-                <a:ea typeface="ＭＳ Ｐゴシック" pitchFamily="34" charset="-128"/>
-              </a:rPr>
-              <a:t>#</a:t>
-            </a:r>
-            <a:r>
-              <a:rPr lang="en-US" altLang="en-US" sz="3600" dirty="0">
-                <a:ea typeface="ＭＳ Ｐゴシック" pitchFamily="34" charset="-128"/>
-              </a:rPr>
-              <a:t>-</a:t>
-            </a:r>
-            <a:r>
-              <a:rPr lang="en-US" altLang="en-US" sz="3600" i="1" dirty="0">
-                <a:ea typeface="ＭＳ Ｐゴシック" pitchFamily="34" charset="-128"/>
-              </a:rPr>
-              <a:t>#</a:t>
-            </a:r>
-            <a:r>
-              <a:rPr lang="en-US" altLang="en-US" sz="3600" dirty="0">
-                <a:ea typeface="ＭＳ Ｐゴシック" pitchFamily="34" charset="-128"/>
-              </a:rPr>
-              <a:t> </a:t>
-            </a:r>
-            <a:r>
-              <a:rPr lang="en-US" altLang="en-US" sz="3600" i="1" dirty="0">
-                <a:ea typeface="ＭＳ Ｐゴシック" pitchFamily="34" charset="-128"/>
-              </a:rPr>
-              <a:t>Month</a:t>
-            </a:r>
-            <a:r>
-              <a:rPr lang="en-US" altLang="en-US" sz="3600" dirty="0">
-                <a:ea typeface="ＭＳ Ｐゴシック" pitchFamily="34" charset="-128"/>
-              </a:rPr>
-              <a:t> </a:t>
-            </a:r>
-            <a:r>
-              <a:rPr lang="en-US" altLang="en-US" sz="3600" i="1" dirty="0">
-                <a:ea typeface="ＭＳ Ｐゴシック" pitchFamily="34" charset="-128"/>
-              </a:rPr>
-              <a:t>Year</a:t>
-            </a:r>
-            <a:endParaRPr lang="en-US" altLang="en-US" i="1" dirty="0">
+              <a:t>Weekly Report for #-# Month 202#</a:t>
+            </a:r>
+            <a:endParaRPr lang="en-US" altLang="en-US" dirty="0">
               <a:ea typeface="ＭＳ Ｐゴシック" pitchFamily="34" charset="-128"/>
             </a:endParaRPr>
           </a:p>

</xml_diff>

<commit_message>
revise: updates to template and weekly update for 11/9-11/13
</commit_message>
<xml_diff>
--- a/docs/WeeklyUpdates/WeeklyUpdateTemplate.pptx
+++ b/docs/WeeklyUpdates/WeeklyUpdateTemplate.pptx
@@ -209,7 +209,7 @@
           <a:p>
             <a:fld id="{435793A2-C00B-48F1-8F7C-3BE850BB26D7}" type="datetimeFigureOut">
               <a:rPr lang="en-US" smtClean="0"/>
-              <a:t>11/12/20</a:t>
+              <a:t>11/13/20</a:t>
             </a:fld>
             <a:endParaRPr lang="en-US"/>
           </a:p>
@@ -4064,7 +4064,7 @@
               <a:rPr lang="en-US" altLang="en-US" sz="1600" dirty="0">
                 <a:ea typeface="ＭＳ Ｐゴシック" pitchFamily="34" charset="-128"/>
               </a:rPr>
-              <a:t>Dr. </a:t>
+              <a:t>Sponsor - Dr. </a:t>
             </a:r>
             <a:r>
               <a:rPr lang="en-US" altLang="en-US" sz="1600" dirty="0" err="1">
@@ -4100,7 +4100,7 @@
               <a:rPr lang="en-US" altLang="en-US" sz="1600" dirty="0">
                 <a:ea typeface="ＭＳ Ｐゴシック" pitchFamily="34" charset="-128"/>
               </a:rPr>
-              <a:t>Mr. Bill Michael</a:t>
+              <a:t>Faculty Advisor - Mr. Bill Michael</a:t>
             </a:r>
           </a:p>
           <a:p>

</xml_diff>

<commit_message>
revise: add team name to Weekly Update template
</commit_message>
<xml_diff>
--- a/docs/WeeklyUpdates/WeeklyUpdateTemplate.pptx
+++ b/docs/WeeklyUpdates/WeeklyUpdateTemplate.pptx
@@ -209,7 +209,7 @@
           <a:p>
             <a:fld id="{435793A2-C00B-48F1-8F7C-3BE850BB26D7}" type="datetimeFigureOut">
               <a:rPr lang="en-US" smtClean="0"/>
-              <a:t>11/13/20</a:t>
+              <a:t>11/15/20</a:t>
             </a:fld>
             <a:endParaRPr lang="en-US"/>
           </a:p>
@@ -4023,7 +4023,7 @@
               <a:rPr lang="en-US" altLang="ja-JP" sz="1600" dirty="0">
                 <a:ea typeface="ＭＳ Ｐゴシック" pitchFamily="34" charset="-128"/>
               </a:rPr>
-              <a:t>&lt;Team Name&gt;</a:t>
+              <a:t>Social Interactivity Mentor for Youth with Autism - NAO Robot (SIMYAN)</a:t>
             </a:r>
           </a:p>
           <a:p>
@@ -4143,7 +4143,7 @@
               <a:pPr/>
               <a:t>1</a:t>
             </a:fld>
-            <a:endParaRPr lang="en-US"/>
+            <a:endParaRPr lang="en-US" dirty="0"/>
           </a:p>
         </p:txBody>
       </p:sp>

</xml_diff>

<commit_message>
revise: group name revision on Weekly Update template
</commit_message>
<xml_diff>
--- a/docs/WeeklyUpdates/WeeklyUpdateTemplate.pptx
+++ b/docs/WeeklyUpdates/WeeklyUpdateTemplate.pptx
@@ -209,7 +209,7 @@
           <a:p>
             <a:fld id="{435793A2-C00B-48F1-8F7C-3BE850BB26D7}" type="datetimeFigureOut">
               <a:rPr lang="en-US" smtClean="0"/>
-              <a:t>11/15/20</a:t>
+              <a:t>11/19/20</a:t>
             </a:fld>
             <a:endParaRPr lang="en-US"/>
           </a:p>
@@ -3863,8 +3863,8 @@
         </p:nvSpPr>
         <p:spPr>
           <a:xfrm>
-            <a:off x="266700" y="2286000"/>
-            <a:ext cx="8382000" cy="2667000"/>
+            <a:off x="266700" y="2285999"/>
+            <a:ext cx="8382000" cy="3521075"/>
           </a:xfrm>
           <a:prstGeom prst="rect">
             <a:avLst/>
@@ -4020,10 +4020,10 @@
               <a:buNone/>
             </a:pPr>
             <a:r>
-              <a:rPr lang="en-US" altLang="ja-JP" sz="1600" dirty="0">
+              <a:rPr lang="en-US" altLang="ja-JP" sz="1900" dirty="0">
                 <a:ea typeface="ＭＳ Ｐゴシック" pitchFamily="34" charset="-128"/>
               </a:rPr>
-              <a:t>Social Interactivity Mentor for Youth with Autism - NAO Robot (SIMYAN)</a:t>
+              <a:t>Social Interactivity Mentor for Youth with Autism using the NAO Robot (SIMYAN)</a:t>
             </a:r>
           </a:p>
           <a:p>

</xml_diff>

<commit_message>
revise: change project name styling
</commit_message>
<xml_diff>
--- a/docs/WeeklyUpdates/WeeklyUpdateTemplate.pptx
+++ b/docs/WeeklyUpdates/WeeklyUpdateTemplate.pptx
@@ -209,7 +209,7 @@
           <a:p>
             <a:fld id="{435793A2-C00B-48F1-8F7C-3BE850BB26D7}" type="datetimeFigureOut">
               <a:rPr lang="en-US" smtClean="0"/>
-              <a:t>11/19/20</a:t>
+              <a:t>11/20/20</a:t>
             </a:fld>
             <a:endParaRPr lang="en-US"/>
           </a:p>
@@ -3863,8 +3863,8 @@
         </p:nvSpPr>
         <p:spPr>
           <a:xfrm>
-            <a:off x="266700" y="2285999"/>
-            <a:ext cx="8382000" cy="3521075"/>
+            <a:off x="152400" y="2314795"/>
+            <a:ext cx="8839200" cy="3825874"/>
           </a:xfrm>
           <a:prstGeom prst="rect">
             <a:avLst/>
@@ -3872,7 +3872,7 @@
         </p:spPr>
         <p:txBody>
           <a:bodyPr vert="horz" lIns="91440" tIns="45720" rIns="91440" bIns="45720" rtlCol="0" anchor="ctr">
-            <a:normAutofit/>
+            <a:normAutofit fontScale="92500" lnSpcReduction="10000"/>
           </a:bodyPr>
           <a:lstStyle>
             <a:lvl1pPr marL="342900" indent="-342900" algn="l" defTabSz="914400" rtl="0" eaLnBrk="1" latinLnBrk="0" hangingPunct="1">
@@ -4013,18 +4013,26 @@
           </a:lstStyle>
           <a:p>
             <a:pPr marL="0" indent="0" algn="ctr">
-              <a:lnSpc>
-                <a:spcPct val="200000"/>
-              </a:lnSpc>
               <a:buFont typeface="Arial" pitchFamily="34" charset="0"/>
               <a:buNone/>
             </a:pPr>
             <a:r>
-              <a:rPr lang="en-US" altLang="ja-JP" sz="1900" dirty="0">
+              <a:rPr lang="en-US" altLang="ja-JP" sz="3600" dirty="0">
                 <a:ea typeface="ＭＳ Ｐゴシック" pitchFamily="34" charset="-128"/>
               </a:rPr>
               <a:t>Social Interactivity Mentor for Youth with Autism using the NAO Robot (SIMYAN)</a:t>
             </a:r>
+          </a:p>
+          <a:p>
+            <a:pPr marL="0" indent="0" algn="ctr">
+              <a:lnSpc>
+                <a:spcPct val="110000"/>
+              </a:lnSpc>
+              <a:buNone/>
+            </a:pPr>
+            <a:endParaRPr lang="en-US" altLang="en-US" sz="1600" dirty="0">
+              <a:ea typeface="ＭＳ Ｐゴシック" pitchFamily="34" charset="-128"/>
+            </a:endParaRPr>
           </a:p>
           <a:p>
             <a:pPr marL="0" indent="0" algn="ctr">

</xml_diff>